<commit_message>
software requirements are for us and not end user
</commit_message>
<xml_diff>
--- a/Sports league management.pptx
+++ b/Sports league management.pptx
@@ -3518,8 +3518,8 @@
         <a:lstStyle/>
         <a:p>
           <a:r>
-            <a:rPr lang="en-US"/>
-            <a:t>JRE 17</a:t>
+            <a:rPr lang="en-US" dirty="0"/>
+            <a:t>JDK 17</a:t>
           </a:r>
         </a:p>
       </dgm:t>
@@ -3744,10 +3744,24 @@
     <dgm:pt modelId="{EA19D368-B2F5-4F47-802D-2CA448F3CB70}" type="parTrans" cxnId="{336857BF-425D-401C-AF9E-6D7AF7B50A66}">
       <dgm:prSet/>
       <dgm:spPr/>
+      <dgm:t>
+        <a:bodyPr/>
+        <a:lstStyle/>
+        <a:p>
+          <a:endParaRPr lang="en-US"/>
+        </a:p>
+      </dgm:t>
     </dgm:pt>
     <dgm:pt modelId="{7124520F-7F36-4D6D-A5DE-B2CF43F30EAC}" type="sibTrans" cxnId="{336857BF-425D-401C-AF9E-6D7AF7B50A66}">
       <dgm:prSet/>
       <dgm:spPr/>
+      <dgm:t>
+        <a:bodyPr/>
+        <a:lstStyle/>
+        <a:p>
+          <a:endParaRPr lang="en-US"/>
+        </a:p>
+      </dgm:t>
     </dgm:pt>
     <dgm:pt modelId="{A7BC58AB-0312-4AF6-B51E-C2D08F65C299}" type="pres">
       <dgm:prSet presAssocID="{9CBFDC6A-7482-4ED4-902C-4B2D423A159D}" presName="linear" presStyleCnt="0">
@@ -5115,8 +5129,8 @@
             <a:buChar char="•"/>
           </a:pPr>
           <a:r>
-            <a:rPr lang="en-US" sz="2500" kern="1200"/>
-            <a:t>JRE 17</a:t>
+            <a:rPr lang="en-US" sz="2500" kern="1200" dirty="0"/>
+            <a:t>JDK 17</a:t>
           </a:r>
         </a:p>
         <a:p>
@@ -9110,7 +9124,7 @@
               <a:pPr>
                 <a:defRPr/>
               </a:pPr>
-              <a:t>10/28/2021</a:t>
+              <a:t>10/29/2021</a:t>
             </a:fld>
             <a:endParaRPr lang="en-US"/>
           </a:p>
@@ -11270,7 +11284,7 @@
               <a:pPr>
                 <a:defRPr/>
               </a:pPr>
-              <a:t>10/28/2021</a:t>
+              <a:t>10/29/2021</a:t>
             </a:fld>
             <a:endParaRPr lang="en-US"/>
           </a:p>
@@ -11708,7 +11722,7 @@
               <a:pPr>
                 <a:defRPr/>
               </a:pPr>
-              <a:t>10/28/2021</a:t>
+              <a:t>10/29/2021</a:t>
             </a:fld>
             <a:endParaRPr lang="en-US"/>
           </a:p>
@@ -11998,7 +12012,7 @@
               <a:pPr>
                 <a:defRPr/>
               </a:pPr>
-              <a:t>10/28/2021</a:t>
+              <a:t>10/29/2021</a:t>
             </a:fld>
             <a:endParaRPr lang="en-US"/>
           </a:p>
@@ -12272,7 +12286,7 @@
               <a:pPr>
                 <a:defRPr/>
               </a:pPr>
-              <a:t>10/28/2021</a:t>
+              <a:t>10/29/2021</a:t>
             </a:fld>
             <a:endParaRPr lang="en-US"/>
           </a:p>
@@ -12681,7 +12695,7 @@
               <a:pPr>
                 <a:defRPr/>
               </a:pPr>
-              <a:t>10/28/2021</a:t>
+              <a:t>10/29/2021</a:t>
             </a:fld>
             <a:endParaRPr lang="en-US"/>
           </a:p>
@@ -12843,7 +12857,7 @@
               <a:pPr>
                 <a:defRPr/>
               </a:pPr>
-              <a:t>10/28/2021</a:t>
+              <a:t>10/29/2021</a:t>
             </a:fld>
             <a:endParaRPr lang="en-US"/>
           </a:p>
@@ -12983,7 +12997,7 @@
               <a:pPr>
                 <a:defRPr/>
               </a:pPr>
-              <a:t>10/28/2021</a:t>
+              <a:t>10/29/2021</a:t>
             </a:fld>
             <a:endParaRPr lang="en-US"/>
           </a:p>
@@ -13303,7 +13317,7 @@
               <a:pPr>
                 <a:defRPr/>
               </a:pPr>
-              <a:t>10/28/2021</a:t>
+              <a:t>10/29/2021</a:t>
             </a:fld>
             <a:endParaRPr lang="en-US"/>
           </a:p>
@@ -13603,7 +13617,7 @@
               <a:pPr>
                 <a:defRPr/>
               </a:pPr>
-              <a:t>10/28/2021</a:t>
+              <a:t>10/29/2021</a:t>
             </a:fld>
             <a:endParaRPr lang="en-US"/>
           </a:p>
@@ -13816,7 +13830,7 @@
               <a:pPr>
                 <a:defRPr/>
               </a:pPr>
-              <a:t>10/28/2021</a:t>
+              <a:t>10/29/2021</a:t>
             </a:fld>
             <a:endParaRPr lang="en-US"/>
           </a:p>
@@ -14039,7 +14053,7 @@
               <a:pPr>
                 <a:defRPr/>
               </a:pPr>
-              <a:t>10/28/2021</a:t>
+              <a:t>10/29/2021</a:t>
             </a:fld>
             <a:endParaRPr lang="en-US"/>
           </a:p>
@@ -14596,7 +14610,7 @@
               <a:pPr>
                 <a:defRPr/>
               </a:pPr>
-              <a:t>10/28/2021</a:t>
+              <a:t>10/29/2021</a:t>
             </a:fld>
             <a:endParaRPr lang="en-US"/>
           </a:p>
@@ -14809,7 +14823,7 @@
               <a:pPr>
                 <a:defRPr/>
               </a:pPr>
-              <a:t>10/28/2021</a:t>
+              <a:t>10/29/2021</a:t>
             </a:fld>
             <a:endParaRPr lang="en-US"/>
           </a:p>
@@ -15099,7 +15113,7 @@
               <a:pPr>
                 <a:defRPr/>
               </a:pPr>
-              <a:t>10/28/2021</a:t>
+              <a:t>10/29/2021</a:t>
             </a:fld>
             <a:endParaRPr lang="en-US"/>
           </a:p>
@@ -15373,7 +15387,7 @@
               <a:pPr>
                 <a:defRPr/>
               </a:pPr>
-              <a:t>10/28/2021</a:t>
+              <a:t>10/29/2021</a:t>
             </a:fld>
             <a:endParaRPr lang="en-US"/>
           </a:p>
@@ -15782,7 +15796,7 @@
               <a:pPr>
                 <a:defRPr/>
               </a:pPr>
-              <a:t>10/28/2021</a:t>
+              <a:t>10/29/2021</a:t>
             </a:fld>
             <a:endParaRPr lang="en-US"/>
           </a:p>
@@ -15944,7 +15958,7 @@
               <a:pPr>
                 <a:defRPr/>
               </a:pPr>
-              <a:t>10/28/2021</a:t>
+              <a:t>10/29/2021</a:t>
             </a:fld>
             <a:endParaRPr lang="en-US"/>
           </a:p>
@@ -16084,7 +16098,7 @@
               <a:pPr>
                 <a:defRPr/>
               </a:pPr>
-              <a:t>10/28/2021</a:t>
+              <a:t>10/29/2021</a:t>
             </a:fld>
             <a:endParaRPr lang="en-US"/>
           </a:p>
@@ -16404,7 +16418,7 @@
               <a:pPr>
                 <a:defRPr/>
               </a:pPr>
-              <a:t>10/28/2021</a:t>
+              <a:t>10/29/2021</a:t>
             </a:fld>
             <a:endParaRPr lang="en-US"/>
           </a:p>
@@ -16704,7 +16718,7 @@
               <a:pPr>
                 <a:defRPr/>
               </a:pPr>
-              <a:t>10/28/2021</a:t>
+              <a:t>10/29/2021</a:t>
             </a:fld>
             <a:endParaRPr lang="en-US"/>
           </a:p>
@@ -16917,7 +16931,7 @@
               <a:pPr>
                 <a:defRPr/>
               </a:pPr>
-              <a:t>10/28/2021</a:t>
+              <a:t>10/29/2021</a:t>
             </a:fld>
             <a:endParaRPr lang="en-US"/>
           </a:p>
@@ -17512,7 +17526,7 @@
               <a:pPr>
                 <a:defRPr/>
               </a:pPr>
-              <a:t>10/28/2021</a:t>
+              <a:t>10/29/2021</a:t>
             </a:fld>
             <a:endParaRPr lang="en-US"/>
           </a:p>
@@ -17747,7 +17761,7 @@
               <a:pPr>
                 <a:defRPr/>
               </a:pPr>
-              <a:t>10/28/2021</a:t>
+              <a:t>10/29/2021</a:t>
             </a:fld>
             <a:endParaRPr lang="en-US"/>
           </a:p>
@@ -17960,7 +17974,7 @@
               <a:pPr>
                 <a:defRPr/>
               </a:pPr>
-              <a:t>10/28/2021</a:t>
+              <a:t>10/29/2021</a:t>
             </a:fld>
             <a:endParaRPr lang="en-US"/>
           </a:p>
@@ -18250,7 +18264,7 @@
               <a:pPr>
                 <a:defRPr/>
               </a:pPr>
-              <a:t>10/28/2021</a:t>
+              <a:t>10/29/2021</a:t>
             </a:fld>
             <a:endParaRPr lang="en-US"/>
           </a:p>
@@ -18524,7 +18538,7 @@
               <a:pPr>
                 <a:defRPr/>
               </a:pPr>
-              <a:t>10/28/2021</a:t>
+              <a:t>10/29/2021</a:t>
             </a:fld>
             <a:endParaRPr lang="en-US"/>
           </a:p>
@@ -18933,7 +18947,7 @@
               <a:pPr>
                 <a:defRPr/>
               </a:pPr>
-              <a:t>10/28/2021</a:t>
+              <a:t>10/29/2021</a:t>
             </a:fld>
             <a:endParaRPr lang="en-US"/>
           </a:p>
@@ -19095,7 +19109,7 @@
               <a:pPr>
                 <a:defRPr/>
               </a:pPr>
-              <a:t>10/28/2021</a:t>
+              <a:t>10/29/2021</a:t>
             </a:fld>
             <a:endParaRPr lang="en-US"/>
           </a:p>
@@ -19235,7 +19249,7 @@
               <a:pPr>
                 <a:defRPr/>
               </a:pPr>
-              <a:t>10/28/2021</a:t>
+              <a:t>10/29/2021</a:t>
             </a:fld>
             <a:endParaRPr lang="en-US"/>
           </a:p>
@@ -19555,7 +19569,7 @@
               <a:pPr>
                 <a:defRPr/>
               </a:pPr>
-              <a:t>10/28/2021</a:t>
+              <a:t>10/29/2021</a:t>
             </a:fld>
             <a:endParaRPr lang="en-US"/>
           </a:p>
@@ -19855,7 +19869,7 @@
               <a:pPr>
                 <a:defRPr/>
               </a:pPr>
-              <a:t>10/28/2021</a:t>
+              <a:t>10/29/2021</a:t>
             </a:fld>
             <a:endParaRPr lang="en-US"/>
           </a:p>
@@ -20580,7 +20594,7 @@
               <a:pPr>
                 <a:defRPr/>
               </a:pPr>
-              <a:t>10/28/2021</a:t>
+              <a:t>10/29/2021</a:t>
             </a:fld>
             <a:endParaRPr lang="en-US"/>
           </a:p>
@@ -20803,7 +20817,7 @@
               <a:pPr>
                 <a:defRPr/>
               </a:pPr>
-              <a:t>10/28/2021</a:t>
+              <a:t>10/29/2021</a:t>
             </a:fld>
             <a:endParaRPr lang="en-US"/>
           </a:p>
@@ -21046,7 +21060,7 @@
               <a:pPr>
                 <a:defRPr/>
               </a:pPr>
-              <a:t>28-10-2021</a:t>
+              <a:t>29-10-2021</a:t>
             </a:fld>
             <a:endParaRPr lang="en-IN"/>
           </a:p>
@@ -21277,7 +21291,7 @@
               <a:pPr>
                 <a:defRPr/>
               </a:pPr>
-              <a:t>28-10-2021</a:t>
+              <a:t>29-10-2021</a:t>
             </a:fld>
             <a:endParaRPr lang="en-IN"/>
           </a:p>
@@ -21574,7 +21588,7 @@
               <a:pPr>
                 <a:defRPr/>
               </a:pPr>
-              <a:t>28-10-2021</a:t>
+              <a:t>29-10-2021</a:t>
             </a:fld>
             <a:endParaRPr lang="en-IN"/>
           </a:p>
@@ -21865,7 +21879,7 @@
               <a:pPr>
                 <a:defRPr/>
               </a:pPr>
-              <a:t>28-10-2021</a:t>
+              <a:t>29-10-2021</a:t>
             </a:fld>
             <a:endParaRPr lang="en-IN"/>
           </a:p>
@@ -22292,7 +22306,7 @@
               <a:pPr>
                 <a:defRPr/>
               </a:pPr>
-              <a:t>28-10-2021</a:t>
+              <a:t>29-10-2021</a:t>
             </a:fld>
             <a:endParaRPr lang="en-IN"/>
           </a:p>
@@ -22463,7 +22477,7 @@
               <a:pPr>
                 <a:defRPr/>
               </a:pPr>
-              <a:t>28-10-2021</a:t>
+              <a:t>29-10-2021</a:t>
             </a:fld>
             <a:endParaRPr lang="en-IN"/>
           </a:p>
@@ -22603,7 +22617,7 @@
               <a:pPr>
                 <a:defRPr/>
               </a:pPr>
-              <a:t>28-10-2021</a:t>
+              <a:t>29-10-2021</a:t>
             </a:fld>
             <a:endParaRPr lang="en-IN"/>
           </a:p>
@@ -22934,7 +22948,7 @@
               <a:pPr>
                 <a:defRPr/>
               </a:pPr>
-              <a:t>28-10-2021</a:t>
+              <a:t>29-10-2021</a:t>
             </a:fld>
             <a:endParaRPr lang="en-IN"/>
           </a:p>
@@ -23438,7 +23452,7 @@
               <a:pPr>
                 <a:defRPr/>
               </a:pPr>
-              <a:t>28-10-2021</a:t>
+              <a:t>29-10-2021</a:t>
             </a:fld>
             <a:endParaRPr lang="en-IN"/>
           </a:p>
@@ -23669,7 +23683,7 @@
               <a:pPr>
                 <a:defRPr/>
               </a:pPr>
-              <a:t>28-10-2021</a:t>
+              <a:t>29-10-2021</a:t>
             </a:fld>
             <a:endParaRPr lang="en-IN"/>
           </a:p>
@@ -23900,7 +23914,7 @@
               <a:pPr>
                 <a:defRPr/>
               </a:pPr>
-              <a:t>28-10-2021</a:t>
+              <a:t>29-10-2021</a:t>
             </a:fld>
             <a:endParaRPr lang="en-IN"/>
           </a:p>
@@ -25429,7 +25443,7 @@
               <a:pPr>
                 <a:defRPr/>
               </a:pPr>
-              <a:t>10/28/2021</a:t>
+              <a:t>10/29/2021</a:t>
             </a:fld>
             <a:endParaRPr lang="en-US"/>
           </a:p>
@@ -26218,7 +26232,7 @@
               <a:pPr>
                 <a:defRPr/>
               </a:pPr>
-              <a:t>10/28/2021</a:t>
+              <a:t>10/29/2021</a:t>
             </a:fld>
             <a:endParaRPr lang="en-US"/>
           </a:p>
@@ -27007,7 +27021,7 @@
               <a:pPr>
                 <a:defRPr/>
               </a:pPr>
-              <a:t>10/28/2021</a:t>
+              <a:t>10/29/2021</a:t>
             </a:fld>
             <a:endParaRPr lang="en-US"/>
           </a:p>
@@ -27640,7 +27654,7 @@
               <a:pPr>
                 <a:defRPr/>
               </a:pPr>
-              <a:t>28-10-2021</a:t>
+              <a:t>29-10-2021</a:t>
             </a:fld>
             <a:endParaRPr lang="en-IN"/>
           </a:p>
@@ -29521,7 +29535,7 @@
           <p:nvPr>
             <p:extLst>
               <p:ext uri="{D42A27DB-BD31-4B8C-83A1-F6EECF244321}">
-                <p14:modId xmlns:p14="http://schemas.microsoft.com/office/powerpoint/2010/main" val="2444863161"/>
+                <p14:modId xmlns:p14="http://schemas.microsoft.com/office/powerpoint/2010/main" val="3874560632"/>
               </p:ext>
             </p:extLst>
           </p:nvPr>

</xml_diff>